<commit_message>
Update English Presentation's files
Co-authored-by: Giuseppe Lepore <giuseppejoelepore@gmail.com>
Co-authored-by: Marcello Tarallo <marcytutorial@gmail.com>
</commit_message>
<xml_diff>
--- a/resources/EN - Suit Database.pptx
+++ b/resources/EN - Suit Database.pptx
@@ -266,7 +266,7 @@
           <a:p>
             <a:fld id="{6705913C-D455-491B-A56E-B276DCE62E7A}" type="datetimeFigureOut">
               <a:rPr lang="it-IT" smtClean="0"/>
-              <a:t>04/03/2019</a:t>
+              <a:t>12/03/2019</a:t>
             </a:fld>
             <a:endParaRPr lang="it-IT"/>
           </a:p>
@@ -436,7 +436,7 @@
           <a:p>
             <a:fld id="{6705913C-D455-491B-A56E-B276DCE62E7A}" type="datetimeFigureOut">
               <a:rPr lang="it-IT" smtClean="0"/>
-              <a:t>04/03/2019</a:t>
+              <a:t>12/03/2019</a:t>
             </a:fld>
             <a:endParaRPr lang="it-IT"/>
           </a:p>
@@ -616,7 +616,7 @@
           <a:p>
             <a:fld id="{6705913C-D455-491B-A56E-B276DCE62E7A}" type="datetimeFigureOut">
               <a:rPr lang="it-IT" smtClean="0"/>
-              <a:t>04/03/2019</a:t>
+              <a:t>12/03/2019</a:t>
             </a:fld>
             <a:endParaRPr lang="it-IT"/>
           </a:p>
@@ -846,7 +846,7 @@
           <a:p>
             <a:fld id="{6705913C-D455-491B-A56E-B276DCE62E7A}" type="datetimeFigureOut">
               <a:rPr lang="it-IT" smtClean="0"/>
-              <a:t>04/03/2019</a:t>
+              <a:t>12/03/2019</a:t>
             </a:fld>
             <a:endParaRPr lang="it-IT"/>
           </a:p>
@@ -1171,7 +1171,7 @@
           <a:p>
             <a:fld id="{6705913C-D455-491B-A56E-B276DCE62E7A}" type="datetimeFigureOut">
               <a:rPr lang="it-IT" smtClean="0"/>
-              <a:t>04/03/2019</a:t>
+              <a:t>12/03/2019</a:t>
             </a:fld>
             <a:endParaRPr lang="it-IT"/>
           </a:p>
@@ -1448,7 +1448,7 @@
           <a:p>
             <a:fld id="{6705913C-D455-491B-A56E-B276DCE62E7A}" type="datetimeFigureOut">
               <a:rPr lang="it-IT" smtClean="0"/>
-              <a:t>04/03/2019</a:t>
+              <a:t>12/03/2019</a:t>
             </a:fld>
             <a:endParaRPr lang="it-IT"/>
           </a:p>
@@ -1842,7 +1842,7 @@
           <a:p>
             <a:fld id="{6705913C-D455-491B-A56E-B276DCE62E7A}" type="datetimeFigureOut">
               <a:rPr lang="it-IT" smtClean="0"/>
-              <a:t>04/03/2019</a:t>
+              <a:t>12/03/2019</a:t>
             </a:fld>
             <a:endParaRPr lang="it-IT"/>
           </a:p>
@@ -2319,7 +2319,7 @@
           <a:p>
             <a:fld id="{6705913C-D455-491B-A56E-B276DCE62E7A}" type="datetimeFigureOut">
               <a:rPr lang="it-IT" smtClean="0"/>
-              <a:t>04/03/2019</a:t>
+              <a:t>12/03/2019</a:t>
             </a:fld>
             <a:endParaRPr lang="it-IT"/>
           </a:p>
@@ -2437,7 +2437,7 @@
           <a:p>
             <a:fld id="{6705913C-D455-491B-A56E-B276DCE62E7A}" type="datetimeFigureOut">
               <a:rPr lang="it-IT" smtClean="0"/>
-              <a:t>04/03/2019</a:t>
+              <a:t>12/03/2019</a:t>
             </a:fld>
             <a:endParaRPr lang="it-IT"/>
           </a:p>
@@ -2532,7 +2532,7 @@
           <a:p>
             <a:fld id="{6705913C-D455-491B-A56E-B276DCE62E7A}" type="datetimeFigureOut">
               <a:rPr lang="it-IT" smtClean="0"/>
-              <a:t>04/03/2019</a:t>
+              <a:t>12/03/2019</a:t>
             </a:fld>
             <a:endParaRPr lang="it-IT"/>
           </a:p>
@@ -2878,7 +2878,7 @@
           <a:p>
             <a:fld id="{6705913C-D455-491B-A56E-B276DCE62E7A}" type="datetimeFigureOut">
               <a:rPr lang="it-IT" smtClean="0"/>
-              <a:t>04/03/2019</a:t>
+              <a:t>12/03/2019</a:t>
             </a:fld>
             <a:endParaRPr lang="it-IT"/>
           </a:p>
@@ -3112,7 +3112,7 @@
           <a:p>
             <a:fld id="{6705913C-D455-491B-A56E-B276DCE62E7A}" type="datetimeFigureOut">
               <a:rPr lang="it-IT" smtClean="0"/>
-              <a:t>04/03/2019</a:t>
+              <a:t>12/03/2019</a:t>
             </a:fld>
             <a:endParaRPr lang="it-IT"/>
           </a:p>
@@ -3436,7 +3436,7 @@
           <a:p>
             <a:fld id="{6705913C-D455-491B-A56E-B276DCE62E7A}" type="datetimeFigureOut">
               <a:rPr lang="it-IT" smtClean="0"/>
-              <a:t>04/03/2019</a:t>
+              <a:t>12/03/2019</a:t>
             </a:fld>
             <a:endParaRPr lang="it-IT"/>
           </a:p>
@@ -3675,7 +3675,7 @@
           <a:p>
             <a:fld id="{6705913C-D455-491B-A56E-B276DCE62E7A}" type="datetimeFigureOut">
               <a:rPr lang="it-IT" smtClean="0"/>
-              <a:t>04/03/2019</a:t>
+              <a:t>12/03/2019</a:t>
             </a:fld>
             <a:endParaRPr lang="it-IT"/>
           </a:p>
@@ -3855,7 +3855,7 @@
           <a:p>
             <a:fld id="{6705913C-D455-491B-A56E-B276DCE62E7A}" type="datetimeFigureOut">
               <a:rPr lang="it-IT" smtClean="0"/>
-              <a:t>04/03/2019</a:t>
+              <a:t>12/03/2019</a:t>
             </a:fld>
             <a:endParaRPr lang="it-IT"/>
           </a:p>
@@ -4106,7 +4106,7 @@
           <a:p>
             <a:fld id="{6705913C-D455-491B-A56E-B276DCE62E7A}" type="datetimeFigureOut">
               <a:rPr lang="it-IT" smtClean="0"/>
-              <a:t>04/03/2019</a:t>
+              <a:t>12/03/2019</a:t>
             </a:fld>
             <a:endParaRPr lang="it-IT"/>
           </a:p>
@@ -4338,7 +4338,7 @@
           <a:p>
             <a:fld id="{6705913C-D455-491B-A56E-B276DCE62E7A}" type="datetimeFigureOut">
               <a:rPr lang="it-IT" smtClean="0"/>
-              <a:t>04/03/2019</a:t>
+              <a:t>12/03/2019</a:t>
             </a:fld>
             <a:endParaRPr lang="it-IT"/>
           </a:p>
@@ -4685,7 +4685,7 @@
           <a:p>
             <a:fld id="{6705913C-D455-491B-A56E-B276DCE62E7A}" type="datetimeFigureOut">
               <a:rPr lang="it-IT" smtClean="0"/>
-              <a:t>04/03/2019</a:t>
+              <a:t>12/03/2019</a:t>
             </a:fld>
             <a:endParaRPr lang="it-IT"/>
           </a:p>
@@ -4803,7 +4803,7 @@
           <a:p>
             <a:fld id="{6705913C-D455-491B-A56E-B276DCE62E7A}" type="datetimeFigureOut">
               <a:rPr lang="it-IT" smtClean="0"/>
-              <a:t>04/03/2019</a:t>
+              <a:t>12/03/2019</a:t>
             </a:fld>
             <a:endParaRPr lang="it-IT"/>
           </a:p>
@@ -4921,7 +4921,7 @@
           <a:p>
             <a:fld id="{6705913C-D455-491B-A56E-B276DCE62E7A}" type="datetimeFigureOut">
               <a:rPr lang="it-IT" smtClean="0"/>
-              <a:t>04/03/2019</a:t>
+              <a:t>12/03/2019</a:t>
             </a:fld>
             <a:endParaRPr lang="it-IT"/>
           </a:p>
@@ -5205,7 +5205,7 @@
           <a:p>
             <a:fld id="{6705913C-D455-491B-A56E-B276DCE62E7A}" type="datetimeFigureOut">
               <a:rPr lang="it-IT" smtClean="0"/>
-              <a:t>04/03/2019</a:t>
+              <a:t>12/03/2019</a:t>
             </a:fld>
             <a:endParaRPr lang="it-IT"/>
           </a:p>
@@ -5469,7 +5469,7 @@
           <a:p>
             <a:fld id="{6705913C-D455-491B-A56E-B276DCE62E7A}" type="datetimeFigureOut">
               <a:rPr lang="it-IT" smtClean="0"/>
-              <a:t>04/03/2019</a:t>
+              <a:t>12/03/2019</a:t>
             </a:fld>
             <a:endParaRPr lang="it-IT"/>
           </a:p>
@@ -5683,7 +5683,7 @@
           <a:p>
             <a:fld id="{6705913C-D455-491B-A56E-B276DCE62E7A}" type="datetimeFigureOut">
               <a:rPr lang="it-IT" smtClean="0"/>
-              <a:t>04/03/2019</a:t>
+              <a:t>12/03/2019</a:t>
             </a:fld>
             <a:endParaRPr lang="it-IT"/>
           </a:p>
@@ -6213,7 +6213,7 @@
           <a:p>
             <a:fld id="{6705913C-D455-491B-A56E-B276DCE62E7A}" type="datetimeFigureOut">
               <a:rPr lang="it-IT" smtClean="0"/>
-              <a:t>04/03/2019</a:t>
+              <a:t>12/03/2019</a:t>
             </a:fld>
             <a:endParaRPr lang="it-IT"/>
           </a:p>
@@ -7067,7 +7067,7 @@
       </p:pic>
       <p:sp>
         <p:nvSpPr>
-          <p:cNvPr id="11" name="Segnaposto contenuto 2"/>
+          <p:cNvPr id="12" name="Segnaposto contenuto 2"/>
           <p:cNvSpPr txBox="1">
             <a:spLocks/>
           </p:cNvSpPr>
@@ -7075,8 +7075,8 @@
         </p:nvSpPr>
         <p:spPr>
           <a:xfrm>
-            <a:off x="9984921" y="6486123"/>
-            <a:ext cx="2197606" cy="361406"/>
+            <a:off x="9313817" y="6486123"/>
+            <a:ext cx="2868710" cy="361406"/>
           </a:xfrm>
           <a:prstGeom prst="rect">
             <a:avLst/>
@@ -7256,13 +7256,22 @@
               <a:buNone/>
             </a:pPr>
             <a:r>
+              <a:rPr lang="it-IT" sz="1600" b="1" dirty="0" smtClean="0">
+                <a:solidFill>
+                  <a:srgbClr val="000000"/>
+                </a:solidFill>
+                <a:latin typeface="Avenir LT Std 35 Light" panose="020B0402020203020204" pitchFamily="34" charset="0"/>
+              </a:rPr>
+              <a:t>In </a:t>
+            </a:r>
+            <a:r>
               <a:rPr lang="it-IT" sz="1600" b="1" dirty="0" err="1" smtClean="0">
                 <a:solidFill>
                   <a:srgbClr val="000000"/>
                 </a:solidFill>
                 <a:latin typeface="Avenir LT Std 35 Light" panose="020B0402020203020204" pitchFamily="34" charset="0"/>
               </a:rPr>
-              <a:t>Being</a:t>
+              <a:t>phase</a:t>
             </a:r>
             <a:r>
               <a:rPr lang="it-IT" sz="1600" b="1" dirty="0" smtClean="0">
@@ -7271,7 +7280,7 @@
                 </a:solidFill>
                 <a:latin typeface="Avenir LT Std 35 Light" panose="020B0402020203020204" pitchFamily="34" charset="0"/>
               </a:rPr>
-              <a:t> </a:t>
+              <a:t> of </a:t>
             </a:r>
             <a:r>
               <a:rPr lang="it-IT" sz="1600" b="1" dirty="0" err="1" smtClean="0">
@@ -7280,7 +7289,7 @@
                 </a:solidFill>
                 <a:latin typeface="Avenir LT Std 35 Light" panose="020B0402020203020204" pitchFamily="34" charset="0"/>
               </a:rPr>
-              <a:t>implemented</a:t>
+              <a:t>implementation</a:t>
             </a:r>
             <a:endParaRPr lang="it-IT" sz="1600" b="1" dirty="0">
               <a:solidFill>
@@ -7381,13 +7390,96 @@
               <a:buNone/>
             </a:pPr>
             <a:r>
+              <a:rPr lang="en-US" dirty="0">
+                <a:solidFill>
+                  <a:srgbClr val="000000"/>
+                </a:solidFill>
+                <a:latin typeface="Avenir LT Std 35 Light" panose="020B0402020203020204" pitchFamily="34" charset="0"/>
+              </a:rPr>
+              <a:t>Our software has the goal to help the company with the hiring process.</a:t>
+            </a:r>
+          </a:p>
+          <a:p>
+            <a:pPr marL="0" indent="0" algn="just">
+              <a:buNone/>
+            </a:pPr>
+            <a:r>
+              <a:rPr lang="it-IT" dirty="0" err="1" smtClean="0">
+                <a:solidFill>
+                  <a:srgbClr val="000000"/>
+                </a:solidFill>
+                <a:latin typeface="Avenir LT Std 35 Light" panose="020B0402020203020204" pitchFamily="34" charset="0"/>
+              </a:rPr>
+              <a:t>Coming</a:t>
+            </a:r>
+            <a:r>
+              <a:rPr lang="it-IT" dirty="0" smtClean="0">
+                <a:solidFill>
+                  <a:srgbClr val="000000"/>
+                </a:solidFill>
+                <a:latin typeface="Avenir LT Std 35 Light" panose="020B0402020203020204" pitchFamily="34" charset="0"/>
+              </a:rPr>
+              <a:t> </a:t>
+            </a:r>
+            <a:r>
+              <a:rPr lang="it-IT" dirty="0" err="1" smtClean="0">
+                <a:solidFill>
+                  <a:srgbClr val="000000"/>
+                </a:solidFill>
+                <a:latin typeface="Avenir LT Std 35 Light" panose="020B0402020203020204" pitchFamily="34" charset="0"/>
+              </a:rPr>
+              <a:t>features</a:t>
+            </a:r>
+            <a:r>
+              <a:rPr lang="it-IT" dirty="0" smtClean="0">
+                <a:solidFill>
+                  <a:srgbClr val="000000"/>
+                </a:solidFill>
+                <a:latin typeface="Avenir LT Std 35 Light" panose="020B0402020203020204" pitchFamily="34" charset="0"/>
+              </a:rPr>
+              <a:t>:</a:t>
+            </a:r>
+            <a:endParaRPr lang="it-IT" dirty="0">
+              <a:solidFill>
+                <a:srgbClr val="000000"/>
+              </a:solidFill>
+              <a:latin typeface="Avenir LT Std 35 Light" panose="020B0402020203020204" pitchFamily="34" charset="0"/>
+            </a:endParaRPr>
+          </a:p>
+          <a:p>
+            <a:pPr lvl="1" algn="just"/>
+            <a:r>
               <a:rPr lang="it-IT" dirty="0">
                 <a:solidFill>
                   <a:srgbClr val="000000"/>
                 </a:solidFill>
                 <a:latin typeface="Avenir LT Std 35 Light" panose="020B0402020203020204" pitchFamily="34" charset="0"/>
               </a:rPr>
-              <a:t>Therefore our software has the goal of simplify the management of candidates for the company.</a:t>
+              <a:t>Add, edit and remove a candidate;</a:t>
+            </a:r>
+          </a:p>
+          <a:p>
+            <a:pPr lvl="1" algn="just"/>
+            <a:r>
+              <a:rPr lang="it-IT" dirty="0">
+                <a:solidFill>
+                  <a:srgbClr val="000000"/>
+                </a:solidFill>
+                <a:latin typeface="Avenir LT Std 35 Light" panose="020B0402020203020204" pitchFamily="34" charset="0"/>
+              </a:rPr>
+              <a:t>Log-in system;</a:t>
+            </a:r>
+          </a:p>
+          <a:p>
+            <a:pPr lvl="1" algn="just"/>
+            <a:r>
+              <a:rPr lang="it-IT" dirty="0">
+                <a:solidFill>
+                  <a:srgbClr val="000000"/>
+                </a:solidFill>
+                <a:latin typeface="Avenir LT Std 35 Light" panose="020B0402020203020204" pitchFamily="34" charset="0"/>
+              </a:rPr>
+              <a:t>New filters.</a:t>
             </a:r>
           </a:p>
           <a:p>
@@ -7401,11 +7493,17 @@
                 </a:solidFill>
                 <a:latin typeface="Avenir LT Std 35 Light" panose="020B0402020203020204" pitchFamily="34" charset="0"/>
               </a:rPr>
-              <a:t>Next implementations:</a:t>
-            </a:r>
-          </a:p>
-          <a:p>
-            <a:pPr lvl="1" algn="just"/>
+              <a:t>The app might be updated in the future to allow to manage </a:t>
+            </a:r>
+            <a:r>
+              <a:rPr lang="it-IT" dirty="0" err="1">
+                <a:solidFill>
+                  <a:srgbClr val="000000"/>
+                </a:solidFill>
+                <a:latin typeface="Avenir LT Std 35 Light" panose="020B0402020203020204" pitchFamily="34" charset="0"/>
+              </a:rPr>
+              <a:t>all</a:t>
+            </a:r>
             <a:r>
               <a:rPr lang="it-IT" dirty="0">
                 <a:solidFill>
@@ -7413,46 +7511,50 @@
                 </a:solidFill>
                 <a:latin typeface="Avenir LT Std 35 Light" panose="020B0402020203020204" pitchFamily="34" charset="0"/>
               </a:rPr>
-              <a:t>Add, edit and remove a candidate;</a:t>
-            </a:r>
-          </a:p>
-          <a:p>
-            <a:pPr lvl="1" algn="just"/>
-            <a:r>
-              <a:rPr lang="it-IT" dirty="0">
+              <a:t> </a:t>
+            </a:r>
+            <a:r>
+              <a:rPr lang="it-IT" dirty="0" smtClean="0">
                 <a:solidFill>
                   <a:srgbClr val="000000"/>
                 </a:solidFill>
                 <a:latin typeface="Avenir LT Std 35 Light" panose="020B0402020203020204" pitchFamily="34" charset="0"/>
               </a:rPr>
-              <a:t>Log-in system;</a:t>
-            </a:r>
-          </a:p>
-          <a:p>
-            <a:pPr lvl="1" algn="just"/>
-            <a:r>
-              <a:rPr lang="it-IT" dirty="0">
+              <a:t>the </a:t>
+            </a:r>
+            <a:r>
+              <a:rPr lang="en-US" dirty="0" smtClean="0">
                 <a:solidFill>
                   <a:srgbClr val="000000"/>
                 </a:solidFill>
                 <a:latin typeface="Avenir LT Std 35 Light" panose="020B0402020203020204" pitchFamily="34" charset="0"/>
               </a:rPr>
-              <a:t>New filters.</a:t>
-            </a:r>
-          </a:p>
-          <a:p>
-            <a:pPr marL="0" indent="0" algn="just">
-              <a:buNone/>
-            </a:pPr>
-            <a:r>
-              <a:rPr lang="it-IT" dirty="0">
+              <a:t>employees </a:t>
+            </a:r>
+            <a:r>
+              <a:rPr lang="en-US" dirty="0">
                 <a:solidFill>
                   <a:srgbClr val="000000"/>
                 </a:solidFill>
                 <a:latin typeface="Avenir LT Std 35 Light" panose="020B0402020203020204" pitchFamily="34" charset="0"/>
               </a:rPr>
-              <a:t>The app might be updated in the future to allow to manage all the human resources of the company.</a:t>
-            </a:r>
+              <a:t>becoming a more general tool for the </a:t>
+            </a:r>
+            <a:r>
+              <a:rPr lang="en-US" dirty="0" smtClean="0">
+                <a:solidFill>
+                  <a:srgbClr val="000000"/>
+                </a:solidFill>
+                <a:latin typeface="Avenir LT Std 35 Light" panose="020B0402020203020204" pitchFamily="34" charset="0"/>
+              </a:rPr>
+              <a:t>company.</a:t>
+            </a:r>
+            <a:endParaRPr lang="it-IT" dirty="0">
+              <a:solidFill>
+                <a:srgbClr val="000000"/>
+              </a:solidFill>
+              <a:latin typeface="Avenir LT Std 35 Light" panose="020B0402020203020204" pitchFamily="34" charset="0"/>
+            </a:endParaRPr>
           </a:p>
         </p:txBody>
       </p:sp>
@@ -7576,14 +7678,14 @@
       </p:sp>
       <p:pic>
         <p:nvPicPr>
-          <p:cNvPr id="11" name="Immagine 10"/>
+          <p:cNvPr id="4" name="Immagine 3"/>
           <p:cNvPicPr>
             <a:picLocks noChangeAspect="1"/>
           </p:cNvPicPr>
           <p:nvPr/>
         </p:nvPicPr>
         <p:blipFill>
-          <a:blip r:embed="rId2" cstate="print">
+          <a:blip r:embed="rId2">
             <a:duotone>
               <a:schemeClr val="accent1">
                 <a:shade val="45000"/>
@@ -7595,53 +7697,6 @@
               <a:ext uri="{BEBA8EAE-BF5A-486C-A8C5-ECC9F3942E4B}">
                 <a14:imgProps xmlns:a14="http://schemas.microsoft.com/office/drawing/2010/main">
                   <a14:imgLayer r:embed="rId3">
-                    <a14:imgEffect>
-                      <a14:brightnessContrast bright="-98000" contrast="-1000"/>
-                    </a14:imgEffect>
-                  </a14:imgLayer>
-                </a14:imgProps>
-              </a:ext>
-              <a:ext uri="{28A0092B-C50C-407E-A947-70E740481C1C}">
-                <a14:useLocalDpi xmlns:a14="http://schemas.microsoft.com/office/drawing/2010/main" val="0"/>
-              </a:ext>
-            </a:extLst>
-          </a:blip>
-          <a:stretch>
-            <a:fillRect/>
-          </a:stretch>
-        </p:blipFill>
-        <p:spPr>
-          <a:xfrm>
-            <a:off x="-1584" y="6357256"/>
-            <a:ext cx="500743" cy="500743"/>
-          </a:xfrm>
-          <a:prstGeom prst="rect">
-            <a:avLst/>
-          </a:prstGeom>
-          <a:noFill/>
-        </p:spPr>
-      </p:pic>
-      <p:pic>
-        <p:nvPicPr>
-          <p:cNvPr id="4" name="Immagine 3"/>
-          <p:cNvPicPr>
-            <a:picLocks noChangeAspect="1"/>
-          </p:cNvPicPr>
-          <p:nvPr/>
-        </p:nvPicPr>
-        <p:blipFill>
-          <a:blip r:embed="rId4">
-            <a:duotone>
-              <a:schemeClr val="accent1">
-                <a:shade val="45000"/>
-                <a:satMod val="135000"/>
-              </a:schemeClr>
-              <a:prstClr val="white"/>
-            </a:duotone>
-            <a:extLst>
-              <a:ext uri="{BEBA8EAE-BF5A-486C-A8C5-ECC9F3942E4B}">
-                <a14:imgProps xmlns:a14="http://schemas.microsoft.com/office/drawing/2010/main">
-                  <a14:imgLayer r:embed="rId5">
                     <a14:imgEffect>
                       <a14:brightnessContrast bright="-100000" contrast="100000"/>
                     </a14:imgEffect>
@@ -7821,8 +7876,23 @@
                 </a:solidFill>
                 <a:latin typeface="Avenir LT Std 35 Light" panose="020B0402020203020204" pitchFamily="34" charset="0"/>
               </a:rPr>
-              <a:t>Suit is our HR management web app that aims to simplify the process of finding and hiring potential candidates.</a:t>
-            </a:r>
+              <a:t>Suit is our HR management web app that aims to simplify the process of finding and </a:t>
+            </a:r>
+            <a:r>
+              <a:rPr lang="en-US" dirty="0" smtClean="0">
+                <a:solidFill>
+                  <a:srgbClr val="000000"/>
+                </a:solidFill>
+                <a:latin typeface="Avenir LT Std 35 Light" panose="020B0402020203020204" pitchFamily="34" charset="0"/>
+              </a:rPr>
+              <a:t>hiring employees.</a:t>
+            </a:r>
+            <a:endParaRPr lang="en-US" dirty="0">
+              <a:solidFill>
+                <a:srgbClr val="000000"/>
+              </a:solidFill>
+              <a:latin typeface="Avenir LT Std 35 Light" panose="020B0402020203020204" pitchFamily="34" charset="0"/>
+            </a:endParaRPr>
           </a:p>
         </p:txBody>
       </p:sp>
@@ -8896,12 +8966,6 @@
               </a:rPr>
               <a:t> bar</a:t>
             </a:r>
-            <a:endParaRPr lang="it-IT" sz="3400" b="1" dirty="0">
-              <a:solidFill>
-                <a:srgbClr val="000000"/>
-              </a:solidFill>
-              <a:latin typeface="Avenir LT Std 35 Light" panose="020B0402020203020204" pitchFamily="34" charset="0"/>
-            </a:endParaRPr>
           </a:p>
         </p:txBody>
       </p:sp>
@@ -8957,12 +9021,6 @@
               </a:rPr>
               <a:t>.</a:t>
             </a:r>
-            <a:endParaRPr lang="en-US" dirty="0">
-              <a:solidFill>
-                <a:srgbClr val="000000"/>
-              </a:solidFill>
-              <a:latin typeface="Avenir LT Std 35 Light" panose="020B0402020203020204" pitchFamily="34" charset="0"/>
-            </a:endParaRPr>
           </a:p>
         </p:txBody>
       </p:sp>
@@ -9272,7 +9330,16 @@
                 </a:solidFill>
                 <a:latin typeface="Avenir LT Std 35 Light" panose="020B0402020203020204" pitchFamily="34" charset="0"/>
               </a:rPr>
-              <a:t> and combine </a:t>
+              <a:t> and </a:t>
+            </a:r>
+            <a:r>
+              <a:rPr lang="it-IT" dirty="0" smtClean="0">
+                <a:solidFill>
+                  <a:srgbClr val="000000"/>
+                </a:solidFill>
+                <a:latin typeface="Avenir LT Std 35 Light" panose="020B0402020203020204" pitchFamily="34" charset="0"/>
+              </a:rPr>
+              <a:t>combine </a:t>
             </a:r>
             <a:r>
               <a:rPr lang="it-IT" dirty="0" err="1" smtClean="0">
@@ -9290,57 +9357,57 @@
                 </a:solidFill>
                 <a:latin typeface="Avenir LT Std 35 Light" panose="020B0402020203020204" pitchFamily="34" charset="0"/>
               </a:rPr>
-              <a:t> in </a:t>
-            </a:r>
-            <a:r>
-              <a:rPr lang="it-IT" dirty="0" err="1" smtClean="0">
-                <a:solidFill>
-                  <a:srgbClr val="000000"/>
-                </a:solidFill>
-                <a:latin typeface="Avenir LT Std 35 Light" panose="020B0402020203020204" pitchFamily="34" charset="0"/>
-              </a:rPr>
-              <a:t>order</a:t>
+              <a:t> </a:t>
+            </a:r>
+            <a:r>
+              <a:rPr lang="it-IT" spc="-1" dirty="0" smtClean="0">
+                <a:solidFill>
+                  <a:schemeClr val="tx1"/>
+                </a:solidFill>
+                <a:latin typeface="Avenir LT Std 35 Light"/>
+              </a:rPr>
+              <a:t>for </a:t>
+            </a:r>
+            <a:r>
+              <a:rPr lang="it-IT" spc="-1" dirty="0">
+                <a:solidFill>
+                  <a:schemeClr val="tx1"/>
+                </a:solidFill>
+                <a:latin typeface="Avenir LT Std 35 Light"/>
+              </a:rPr>
+              <a:t>a more </a:t>
+            </a:r>
+            <a:r>
+              <a:rPr lang="it-IT" spc="-1" dirty="0" err="1">
+                <a:solidFill>
+                  <a:schemeClr val="tx1"/>
+                </a:solidFill>
+                <a:latin typeface="Avenir LT Std 35 Light"/>
+              </a:rPr>
+              <a:t>detailed</a:t>
+            </a:r>
+            <a:r>
+              <a:rPr lang="it-IT" spc="-1" dirty="0">
+                <a:solidFill>
+                  <a:schemeClr val="tx1"/>
+                </a:solidFill>
+                <a:latin typeface="Avenir LT Std 35 Light"/>
+              </a:rPr>
+              <a:t> </a:t>
+            </a:r>
+            <a:r>
+              <a:rPr lang="it-IT" spc="-1" dirty="0" err="1">
+                <a:solidFill>
+                  <a:schemeClr val="tx1"/>
+                </a:solidFill>
+                <a:latin typeface="Avenir LT Std 35 Light"/>
+              </a:rPr>
+              <a:t>search</a:t>
             </a:r>
             <a:r>
               <a:rPr lang="it-IT" dirty="0" smtClean="0">
                 <a:solidFill>
-                  <a:srgbClr val="000000"/>
-                </a:solidFill>
-                <a:latin typeface="Avenir LT Std 35 Light" panose="020B0402020203020204" pitchFamily="34" charset="0"/>
-              </a:rPr>
-              <a:t> to show </a:t>
-            </a:r>
-            <a:r>
-              <a:rPr lang="it-IT" dirty="0" err="1">
-                <a:solidFill>
-                  <a:srgbClr val="000000"/>
-                </a:solidFill>
-                <a:latin typeface="Avenir LT Std 35 Light" panose="020B0402020203020204" pitchFamily="34" charset="0"/>
-              </a:rPr>
-              <a:t>specific</a:t>
-            </a:r>
-            <a:r>
-              <a:rPr lang="it-IT" dirty="0">
-                <a:solidFill>
-                  <a:srgbClr val="000000"/>
-                </a:solidFill>
-                <a:latin typeface="Avenir LT Std 35 Light" panose="020B0402020203020204" pitchFamily="34" charset="0"/>
-              </a:rPr>
-              <a:t> </a:t>
-            </a:r>
-            <a:r>
-              <a:rPr lang="it-IT" dirty="0" err="1">
-                <a:solidFill>
-                  <a:srgbClr val="000000"/>
-                </a:solidFill>
-                <a:latin typeface="Avenir LT Std 35 Light" panose="020B0402020203020204" pitchFamily="34" charset="0"/>
-              </a:rPr>
-              <a:t>candidates</a:t>
-            </a:r>
-            <a:r>
-              <a:rPr lang="it-IT" dirty="0">
-                <a:solidFill>
-                  <a:srgbClr val="000000"/>
+                  <a:schemeClr val="tx1"/>
                 </a:solidFill>
                 <a:latin typeface="Avenir LT Std 35 Light" panose="020B0402020203020204" pitchFamily="34" charset="0"/>
               </a:rPr>
@@ -9348,7 +9415,7 @@
             </a:r>
             <a:endParaRPr lang="it-IT" dirty="0">
               <a:solidFill>
-                <a:srgbClr val="000000"/>
+                <a:schemeClr val="tx1"/>
               </a:solidFill>
               <a:latin typeface="Avenir LT Std 35 Light" panose="020B0402020203020204" pitchFamily="34" charset="0"/>
             </a:endParaRPr>
@@ -9365,8 +9432,8 @@
         </p:nvSpPr>
         <p:spPr>
           <a:xfrm>
-            <a:off x="10466614" y="6486123"/>
-            <a:ext cx="1715914" cy="361406"/>
+            <a:off x="9679577" y="6486123"/>
+            <a:ext cx="2502951" cy="361406"/>
           </a:xfrm>
           <a:prstGeom prst="rect">
             <a:avLst/>
@@ -9546,13 +9613,22 @@
               <a:buNone/>
             </a:pPr>
             <a:r>
+              <a:rPr lang="it-IT" sz="1600" b="1" dirty="0" smtClean="0">
+                <a:solidFill>
+                  <a:srgbClr val="000000"/>
+                </a:solidFill>
+                <a:latin typeface="Avenir LT Std 35 Light" panose="020B0402020203020204" pitchFamily="34" charset="0"/>
+              </a:rPr>
+              <a:t>In </a:t>
+            </a:r>
+            <a:r>
               <a:rPr lang="it-IT" sz="1600" b="1" dirty="0" err="1" smtClean="0">
                 <a:solidFill>
                   <a:srgbClr val="000000"/>
                 </a:solidFill>
                 <a:latin typeface="Avenir LT Std 35 Light" panose="020B0402020203020204" pitchFamily="34" charset="0"/>
               </a:rPr>
-              <a:t>Being</a:t>
+              <a:t>phase</a:t>
             </a:r>
             <a:r>
               <a:rPr lang="it-IT" sz="1600" b="1" dirty="0" smtClean="0">
@@ -9561,7 +9637,7 @@
                 </a:solidFill>
                 <a:latin typeface="Avenir LT Std 35 Light" panose="020B0402020203020204" pitchFamily="34" charset="0"/>
               </a:rPr>
-              <a:t> </a:t>
+              <a:t> of </a:t>
             </a:r>
             <a:r>
               <a:rPr lang="it-IT" sz="1600" b="1" dirty="0" err="1" smtClean="0">
@@ -9570,7 +9646,7 @@
                 </a:solidFill>
                 <a:latin typeface="Avenir LT Std 35 Light" panose="020B0402020203020204" pitchFamily="34" charset="0"/>
               </a:rPr>
-              <a:t>modified</a:t>
+              <a:t>modification</a:t>
             </a:r>
             <a:endParaRPr lang="it-IT" sz="1600" b="1" dirty="0">
               <a:solidFill>
@@ -9759,7 +9835,7 @@
         <p:spPr>
           <a:xfrm>
             <a:off x="1792151" y="1524089"/>
-            <a:ext cx="3110049" cy="439592"/>
+            <a:ext cx="3968569" cy="439592"/>
           </a:xfrm>
         </p:spPr>
         <p:txBody>
@@ -9781,7 +9857,16 @@
                 </a:solidFill>
                 <a:latin typeface="Avenir LT Std 35 Light" panose="020B0402020203020204" pitchFamily="34" charset="0"/>
               </a:rPr>
-              <a:t>Delete</a:t>
+              <a:t>Rejected</a:t>
+            </a:r>
+            <a:r>
+              <a:rPr lang="it-IT" dirty="0" smtClean="0">
+                <a:solidFill>
+                  <a:srgbClr val="000000"/>
+                </a:solidFill>
+                <a:latin typeface="Avenir LT Std 35 Light" panose="020B0402020203020204" pitchFamily="34" charset="0"/>
+              </a:rPr>
+              <a:t> or </a:t>
             </a:r>
             <a:r>
               <a:rPr lang="it-IT" dirty="0" err="1" smtClean="0">
@@ -9790,7 +9875,7 @@
                 </a:solidFill>
                 <a:latin typeface="Avenir LT Std 35 Light" panose="020B0402020203020204" pitchFamily="34" charset="0"/>
               </a:rPr>
-              <a:t>d</a:t>
+              <a:t>hired</a:t>
             </a:r>
             <a:r>
               <a:rPr lang="it-IT" dirty="0" smtClean="0">
@@ -10102,13 +10187,22 @@
               <a:buNone/>
             </a:pPr>
             <a:r>
+              <a:rPr lang="it-IT" dirty="0" err="1" smtClean="0">
+                <a:solidFill>
+                  <a:srgbClr val="000000"/>
+                </a:solidFill>
+                <a:latin typeface="Avenir LT Std 35 Light" panose="020B0402020203020204" pitchFamily="34" charset="0"/>
+              </a:rPr>
+              <a:t>Not</a:t>
+            </a:r>
+            <a:r>
               <a:rPr lang="it-IT" dirty="0" smtClean="0">
                 <a:solidFill>
                   <a:srgbClr val="000000"/>
                 </a:solidFill>
                 <a:latin typeface="Avenir LT Std 35 Light" panose="020B0402020203020204" pitchFamily="34" charset="0"/>
               </a:rPr>
-              <a:t>Non-</a:t>
+              <a:t> </a:t>
             </a:r>
             <a:r>
               <a:rPr lang="it-IT" dirty="0" err="1" smtClean="0">
@@ -10126,7 +10220,25 @@
                 </a:solidFill>
                 <a:latin typeface="Avenir LT Std 35 Light" panose="020B0402020203020204" pitchFamily="34" charset="0"/>
               </a:rPr>
-              <a:t> and non-</a:t>
+              <a:t> and </a:t>
+            </a:r>
+            <a:r>
+              <a:rPr lang="it-IT" dirty="0" err="1" smtClean="0">
+                <a:solidFill>
+                  <a:srgbClr val="000000"/>
+                </a:solidFill>
+                <a:latin typeface="Avenir LT Std 35 Light" panose="020B0402020203020204" pitchFamily="34" charset="0"/>
+              </a:rPr>
+              <a:t>not</a:t>
+            </a:r>
+            <a:r>
+              <a:rPr lang="it-IT" dirty="0" smtClean="0">
+                <a:solidFill>
+                  <a:srgbClr val="000000"/>
+                </a:solidFill>
+                <a:latin typeface="Avenir LT Std 35 Light" panose="020B0402020203020204" pitchFamily="34" charset="0"/>
+              </a:rPr>
+              <a:t> </a:t>
             </a:r>
             <a:r>
               <a:rPr lang="it-IT" dirty="0" err="1" smtClean="0">
@@ -10430,7 +10542,7 @@
                 </a:solidFill>
                 <a:latin typeface="Avenir LT Std 35 Light" panose="020B0402020203020204" pitchFamily="34" charset="0"/>
               </a:rPr>
-              <a:t>Hired</a:t>
+              <a:t>Employed</a:t>
             </a:r>
             <a:r>
               <a:rPr lang="it-IT" dirty="0" smtClean="0">
@@ -11196,11 +11308,32 @@
           <a:lstStyle/>
           <a:p>
             <a:r>
-              <a:rPr lang="it-IT" dirty="0">
+              <a:rPr lang="it-IT" dirty="0" err="1" smtClean="0">
                 <a:latin typeface="Avenir LT Std 35 Light" panose="020B0402020203020204" pitchFamily="34" charset="0"/>
               </a:rPr>
-              <a:t>In the future there will be also:</a:t>
-            </a:r>
+              <a:t>Coming</a:t>
+            </a:r>
+            <a:r>
+              <a:rPr lang="it-IT" dirty="0" smtClean="0">
+                <a:latin typeface="Avenir LT Std 35 Light" panose="020B0402020203020204" pitchFamily="34" charset="0"/>
+              </a:rPr>
+              <a:t> </a:t>
+            </a:r>
+            <a:r>
+              <a:rPr lang="it-IT" dirty="0" err="1" smtClean="0">
+                <a:latin typeface="Avenir LT Std 35 Light" panose="020B0402020203020204" pitchFamily="34" charset="0"/>
+              </a:rPr>
+              <a:t>soon</a:t>
+            </a:r>
+            <a:r>
+              <a:rPr lang="it-IT" dirty="0" smtClean="0">
+                <a:latin typeface="Avenir LT Std 35 Light" panose="020B0402020203020204" pitchFamily="34" charset="0"/>
+              </a:rPr>
+              <a:t>:</a:t>
+            </a:r>
+            <a:endParaRPr lang="it-IT" dirty="0">
+              <a:latin typeface="Avenir LT Std 35 Light" panose="020B0402020203020204" pitchFamily="34" charset="0"/>
+            </a:endParaRPr>
           </a:p>
           <a:p>
             <a:pPr marL="285750" indent="-285750">
@@ -11405,8 +11538,8 @@
         </p:nvSpPr>
         <p:spPr>
           <a:xfrm>
-            <a:off x="9984921" y="6486123"/>
-            <a:ext cx="2197606" cy="361406"/>
+            <a:off x="9313817" y="6486123"/>
+            <a:ext cx="2868710" cy="361406"/>
           </a:xfrm>
           <a:prstGeom prst="rect">
             <a:avLst/>
@@ -11586,13 +11719,22 @@
               <a:buNone/>
             </a:pPr>
             <a:r>
+              <a:rPr lang="it-IT" sz="1600" b="1" dirty="0" smtClean="0">
+                <a:solidFill>
+                  <a:srgbClr val="000000"/>
+                </a:solidFill>
+                <a:latin typeface="Avenir LT Std 35 Light" panose="020B0402020203020204" pitchFamily="34" charset="0"/>
+              </a:rPr>
+              <a:t>In </a:t>
+            </a:r>
+            <a:r>
               <a:rPr lang="it-IT" sz="1600" b="1" dirty="0" err="1" smtClean="0">
                 <a:solidFill>
                   <a:srgbClr val="000000"/>
                 </a:solidFill>
                 <a:latin typeface="Avenir LT Std 35 Light" panose="020B0402020203020204" pitchFamily="34" charset="0"/>
               </a:rPr>
-              <a:t>Being</a:t>
+              <a:t>phase</a:t>
             </a:r>
             <a:r>
               <a:rPr lang="it-IT" sz="1600" b="1" dirty="0" smtClean="0">
@@ -11601,7 +11743,7 @@
                 </a:solidFill>
                 <a:latin typeface="Avenir LT Std 35 Light" panose="020B0402020203020204" pitchFamily="34" charset="0"/>
               </a:rPr>
-              <a:t> </a:t>
+              <a:t> of </a:t>
             </a:r>
             <a:r>
               <a:rPr lang="it-IT" sz="1600" b="1" dirty="0" err="1" smtClean="0">
@@ -11610,7 +11752,7 @@
                 </a:solidFill>
                 <a:latin typeface="Avenir LT Std 35 Light" panose="020B0402020203020204" pitchFamily="34" charset="0"/>
               </a:rPr>
-              <a:t>implemented</a:t>
+              <a:t>implementation</a:t>
             </a:r>
             <a:endParaRPr lang="it-IT" sz="1600" b="1" dirty="0">
               <a:solidFill>

</xml_diff>

<commit_message>
Add school logo in presentation
Co-authored-by: Marcello Tarallo <marcytutorial@gmail.com>
</commit_message>
<xml_diff>
--- a/resources/EN - Suit Database.pptx
+++ b/resources/EN - Suit Database.pptx
@@ -6830,13 +6830,43 @@
         </p:blipFill>
         <p:spPr>
           <a:xfrm>
-            <a:off x="4721469" y="3262735"/>
-            <a:ext cx="2636520" cy="2636520"/>
+            <a:off x="4906149" y="3347143"/>
+            <a:ext cx="2278423" cy="2278423"/>
           </a:xfrm>
           <a:prstGeom prst="rect">
             <a:avLst/>
           </a:prstGeom>
           <a:noFill/>
+        </p:spPr>
+      </p:pic>
+      <p:pic>
+        <p:nvPicPr>
+          <p:cNvPr id="3" name="Immagine 2"/>
+          <p:cNvPicPr>
+            <a:picLocks noChangeAspect="1"/>
+          </p:cNvPicPr>
+          <p:nvPr/>
+        </p:nvPicPr>
+        <p:blipFill>
+          <a:blip r:embed="rId4">
+            <a:extLst>
+              <a:ext uri="{28A0092B-C50C-407E-A947-70E740481C1C}">
+                <a14:useLocalDpi xmlns:a14="http://schemas.microsoft.com/office/drawing/2010/main" val="0"/>
+              </a:ext>
+            </a:extLst>
+          </a:blip>
+          <a:stretch>
+            <a:fillRect/>
+          </a:stretch>
+        </p:blipFill>
+        <p:spPr>
+          <a:xfrm>
+            <a:off x="43336" y="5290457"/>
+            <a:ext cx="1424393" cy="1773104"/>
+          </a:xfrm>
+          <a:prstGeom prst="rect">
+            <a:avLst/>
+          </a:prstGeom>
         </p:spPr>
       </p:pic>
     </p:spTree>
@@ -7376,8 +7406,8 @@
         </p:nvSpPr>
         <p:spPr>
           <a:xfrm>
-            <a:off x="1024576" y="1407650"/>
-            <a:ext cx="10515600" cy="4379195"/>
+            <a:off x="1024576" y="1407651"/>
+            <a:ext cx="10515600" cy="5176030"/>
           </a:xfrm>
         </p:spPr>
         <p:txBody>
@@ -7547,11 +7577,97 @@
                 </a:solidFill>
                 <a:latin typeface="Avenir LT Std 35 Light" panose="020B0402020203020204" pitchFamily="34" charset="0"/>
               </a:rPr>
-              <a:t>company.</a:t>
+              <a:t>company</a:t>
+            </a:r>
+            <a:r>
+              <a:rPr lang="en-US" dirty="0" smtClean="0">
+                <a:solidFill>
+                  <a:srgbClr val="000000"/>
+                </a:solidFill>
+                <a:latin typeface="Avenir LT Std 35 Light" panose="020B0402020203020204" pitchFamily="34" charset="0"/>
+              </a:rPr>
+              <a:t>.</a:t>
+            </a:r>
+          </a:p>
+          <a:p>
+            <a:pPr marL="0" indent="0" algn="just">
+              <a:buNone/>
+            </a:pPr>
+            <a:endParaRPr lang="en-US" dirty="0">
+              <a:solidFill>
+                <a:srgbClr val="000000"/>
+              </a:solidFill>
+              <a:latin typeface="Avenir LT Std 35 Light" panose="020B0402020203020204" pitchFamily="34" charset="0"/>
+            </a:endParaRPr>
+          </a:p>
+          <a:p>
+            <a:pPr marL="0" indent="0" algn="just">
+              <a:buNone/>
+            </a:pPr>
+            <a:endParaRPr lang="en-US" dirty="0" smtClean="0">
+              <a:solidFill>
+                <a:srgbClr val="000000"/>
+              </a:solidFill>
+              <a:latin typeface="Avenir LT Std 35 Light" panose="020B0402020203020204" pitchFamily="34" charset="0"/>
+            </a:endParaRPr>
+          </a:p>
+          <a:p>
+            <a:pPr marL="0" indent="0" algn="just">
+              <a:buNone/>
+            </a:pPr>
+            <a:endParaRPr lang="en-US" dirty="0">
+              <a:solidFill>
+                <a:srgbClr val="000000"/>
+              </a:solidFill>
+              <a:latin typeface="Avenir LT Std 35 Light" panose="020B0402020203020204" pitchFamily="34" charset="0"/>
+            </a:endParaRPr>
+          </a:p>
+          <a:p>
+            <a:pPr marL="0" indent="0" algn="just">
+              <a:buNone/>
+            </a:pPr>
+            <a:endParaRPr lang="en-US" dirty="0">
+              <a:solidFill>
+                <a:srgbClr val="000000"/>
+              </a:solidFill>
+              <a:latin typeface="Avenir LT Std 35 Light" panose="020B0402020203020204" pitchFamily="34" charset="0"/>
+            </a:endParaRPr>
+          </a:p>
+          <a:p>
+            <a:pPr marL="0" indent="0">
+              <a:buNone/>
+            </a:pPr>
+            <a:r>
+              <a:rPr lang="en-US" dirty="0" smtClean="0">
+                <a:solidFill>
+                  <a:srgbClr val="000000"/>
+                </a:solidFill>
+                <a:latin typeface="Avenir LT Std 35 Light" panose="020B0402020203020204" pitchFamily="34" charset="0"/>
+              </a:rPr>
+              <a:t>GitHub </a:t>
+            </a:r>
+            <a:r>
+              <a:rPr lang="en-US" dirty="0">
+                <a:solidFill>
+                  <a:srgbClr val="000000"/>
+                </a:solidFill>
+                <a:latin typeface="Avenir LT Std 35 Light" panose="020B0402020203020204" pitchFamily="34" charset="0"/>
+              </a:rPr>
+              <a:t>project link: </a:t>
+            </a:r>
+            <a:r>
+              <a:rPr lang="en-US" dirty="0">
+                <a:solidFill>
+                  <a:srgbClr val="FF0000"/>
+                </a:solidFill>
+                <a:latin typeface="Avenir LT Std 35 Light" panose="020B0402020203020204" pitchFamily="34" charset="0"/>
+                <a:hlinkClick r:id="rId2"/>
+              </a:rPr>
+              <a:t>https://github.com/lt-scuolalavoro/suit</a:t>
             </a:r>
             <a:endParaRPr lang="it-IT" dirty="0">
               <a:solidFill>
-                <a:srgbClr val="000000"/>
+                <a:srgbClr val="FF0000"/>
               </a:solidFill>
               <a:latin typeface="Avenir LT Std 35 Light" panose="020B0402020203020204" pitchFamily="34" charset="0"/>
             </a:endParaRPr>
@@ -7567,7 +7683,7 @@
           <p:nvPr/>
         </p:nvPicPr>
         <p:blipFill>
-          <a:blip r:embed="rId2" cstate="print">
+          <a:blip r:embed="rId3" cstate="print">
             <a:duotone>
               <a:schemeClr val="accent1">
                 <a:shade val="45000"/>
@@ -7578,7 +7694,7 @@
             <a:extLst>
               <a:ext uri="{BEBA8EAE-BF5A-486C-A8C5-ECC9F3942E4B}">
                 <a14:imgProps xmlns:a14="http://schemas.microsoft.com/office/drawing/2010/main">
-                  <a14:imgLayer r:embed="rId3">
+                  <a14:imgLayer r:embed="rId4">
                     <a14:imgEffect>
                       <a14:brightnessContrast bright="-98000" contrast="-1000"/>
                     </a14:imgEffect>
@@ -12131,7 +12247,7 @@
 <file path=ppt/theme/theme2.xml><?xml version="1.0" encoding="utf-8"?>
 <a:theme xmlns:a="http://schemas.openxmlformats.org/drawingml/2006/main" name="Crop">
   <a:themeElements>
-    <a:clrScheme name="Personalizzato 4">
+    <a:clrScheme name="Personalizzato 5">
       <a:dk1>
         <a:sysClr val="windowText" lastClr="000000"/>
       </a:dk1>
@@ -12163,7 +12279,7 @@
         <a:srgbClr val="E28394"/>
       </a:accent6>
       <a:hlink>
-        <a:srgbClr val="77A2BB"/>
+        <a:srgbClr val="002060"/>
       </a:hlink>
       <a:folHlink>
         <a:srgbClr val="957A99"/>

</xml_diff>

<commit_message>
Add Lanit Tercom logo in presentation
</commit_message>
<xml_diff>
--- a/resources/EN - Suit Database.pptx
+++ b/resources/EN - Suit Database.pptx
@@ -6830,7 +6830,7 @@
         </p:blipFill>
         <p:spPr>
           <a:xfrm>
-            <a:off x="4906149" y="3347143"/>
+            <a:off x="2842218" y="3339872"/>
             <a:ext cx="2278423" cy="2278423"/>
           </a:xfrm>
           <a:prstGeom prst="rect">
@@ -6863,6 +6863,36 @@
           <a:xfrm>
             <a:off x="43336" y="5290457"/>
             <a:ext cx="1424393" cy="1773104"/>
+          </a:xfrm>
+          <a:prstGeom prst="rect">
+            <a:avLst/>
+          </a:prstGeom>
+        </p:spPr>
+      </p:pic>
+      <p:pic>
+        <p:nvPicPr>
+          <p:cNvPr id="4" name="Immagine 3"/>
+          <p:cNvPicPr>
+            <a:picLocks noChangeAspect="1"/>
+          </p:cNvPicPr>
+          <p:nvPr/>
+        </p:nvPicPr>
+        <p:blipFill>
+          <a:blip r:embed="rId5" cstate="print">
+            <a:extLst>
+              <a:ext uri="{28A0092B-C50C-407E-A947-70E740481C1C}">
+                <a14:useLocalDpi xmlns:a14="http://schemas.microsoft.com/office/drawing/2010/main" val="0"/>
+              </a:ext>
+            </a:extLst>
+          </a:blip>
+          <a:stretch>
+            <a:fillRect/>
+          </a:stretch>
+        </p:blipFill>
+        <p:spPr>
+          <a:xfrm>
+            <a:off x="6003223" y="3823016"/>
+            <a:ext cx="3725924" cy="1319406"/>
           </a:xfrm>
           <a:prstGeom prst="rect">
             <a:avLst/>
@@ -7577,16 +7607,7 @@
                 </a:solidFill>
                 <a:latin typeface="Avenir LT Std 35 Light" panose="020B0402020203020204" pitchFamily="34" charset="0"/>
               </a:rPr>
-              <a:t>company</a:t>
-            </a:r>
-            <a:r>
-              <a:rPr lang="en-US" dirty="0" smtClean="0">
-                <a:solidFill>
-                  <a:srgbClr val="000000"/>
-                </a:solidFill>
-                <a:latin typeface="Avenir LT Std 35 Light" panose="020B0402020203020204" pitchFamily="34" charset="0"/>
-              </a:rPr>
-              <a:t>.</a:t>
+              <a:t>company.</a:t>
             </a:r>
           </a:p>
           <a:p>

</xml_diff>